<commit_message>
Opdatere med mine egne noter + små ændringer i slides
</commit_message>
<xml_diff>
--- a/Præsentation.pptx
+++ b/Præsentation.pptx
@@ -266,38 +266,37 @@
           <a:p>
             <a:pPr lvl="0"/>
             <a:r>
-              <a:rPr lang="da-DK" smtClean="0"/>
+              <a:rPr lang="da-DK"/>
               <a:t>Rediger typografien i masterens</a:t>
             </a:r>
           </a:p>
           <a:p>
             <a:pPr lvl="1"/>
             <a:r>
-              <a:rPr lang="da-DK" smtClean="0"/>
+              <a:rPr lang="da-DK"/>
               <a:t>Andet niveau</a:t>
             </a:r>
           </a:p>
           <a:p>
             <a:pPr lvl="2"/>
             <a:r>
-              <a:rPr lang="da-DK" smtClean="0"/>
+              <a:rPr lang="da-DK"/>
               <a:t>Tredje niveau</a:t>
             </a:r>
           </a:p>
           <a:p>
             <a:pPr lvl="3"/>
             <a:r>
-              <a:rPr lang="da-DK" smtClean="0"/>
+              <a:rPr lang="da-DK"/>
               <a:t>Fjerde niveau</a:t>
             </a:r>
           </a:p>
           <a:p>
             <a:pPr lvl="4"/>
             <a:r>
-              <a:rPr lang="da-DK" smtClean="0"/>
+              <a:rPr lang="da-DK"/>
               <a:t>Femte niveau</a:t>
             </a:r>
-            <a:endParaRPr lang="da-DK"/>
           </a:p>
         </p:txBody>
       </p:sp>
@@ -515,58 +514,98 @@
           <a:lstStyle/>
           <a:p>
             <a:r>
-              <a:rPr lang="da-DK" dirty="0" smtClean="0"/>
-              <a:t>Vedvarende fluktuerende </a:t>
-            </a:r>
-            <a:r>
-              <a:rPr lang="da-DK" dirty="0" smtClean="0"/>
-              <a:t>energi - Jeppe</a:t>
-            </a:r>
-            <a:endParaRPr lang="da-DK" dirty="0" smtClean="0"/>
-          </a:p>
-          <a:p>
-            <a:r>
-              <a:rPr lang="da-DK" dirty="0" smtClean="0"/>
+              <a:rPr lang="da-DK" dirty="0"/>
+              <a:t>Vedvarende fluktuerende energi - Jeppe</a:t>
+            </a:r>
+          </a:p>
+          <a:p>
+            <a:r>
+              <a:rPr lang="da-DK" dirty="0"/>
               <a:t>Øget mængde af vedvarende</a:t>
             </a:r>
             <a:r>
-              <a:rPr lang="da-DK" baseline="0" dirty="0" smtClean="0"/>
+              <a:rPr lang="da-DK" baseline="0" dirty="0"/>
               <a:t> energi.</a:t>
             </a:r>
           </a:p>
           <a:p>
             <a:r>
-              <a:rPr lang="da-DK" baseline="0" dirty="0" smtClean="0"/>
+              <a:rPr lang="da-DK" baseline="0" dirty="0"/>
               <a:t>Ikke samme kontrol af produktion</a:t>
             </a:r>
           </a:p>
           <a:p>
             <a:r>
-              <a:rPr lang="da-DK" baseline="0" dirty="0" smtClean="0"/>
+              <a:rPr lang="da-DK" baseline="0" dirty="0"/>
               <a:t>Løses vha. batterier eller forstærket transmission til udlandet, aggregering.</a:t>
             </a:r>
           </a:p>
           <a:p>
             <a:r>
-              <a:rPr lang="da-DK" baseline="0" dirty="0" smtClean="0"/>
+              <a:rPr lang="da-DK" baseline="0" dirty="0"/>
               <a:t>Undersøge batteriers stabilitet i det danske el-net.</a:t>
             </a:r>
           </a:p>
           <a:p>
-            <a:endParaRPr lang="da-DK" baseline="0" dirty="0" smtClean="0"/>
-          </a:p>
-          <a:p>
-            <a:endParaRPr lang="da-DK" baseline="0" dirty="0" smtClean="0"/>
-          </a:p>
-          <a:p>
-            <a:r>
-              <a:rPr lang="da-DK" baseline="0" dirty="0" smtClean="0"/>
+            <a:endParaRPr lang="da-DK" baseline="0" dirty="0"/>
+          </a:p>
+          <a:p>
+            <a:endParaRPr lang="da-DK" baseline="0" dirty="0"/>
+          </a:p>
+          <a:p>
+            <a:r>
+              <a:rPr lang="da-DK" b="1" baseline="0" dirty="0"/>
               <a:t>Cases - Laurids</a:t>
             </a:r>
-            <a:endParaRPr lang="da-DK" baseline="0" dirty="0" smtClean="0"/>
-          </a:p>
-          <a:p>
-            <a:endParaRPr lang="da-DK" baseline="0" dirty="0" smtClean="0"/>
+          </a:p>
+          <a:p>
+            <a:r>
+              <a:rPr lang="da-DK" b="1" baseline="0" dirty="0"/>
+              <a:t>1: </a:t>
+            </a:r>
+            <a:r>
+              <a:rPr lang="da-DK" baseline="0" dirty="0"/>
+              <a:t>Generel undersøgelse af hvordan et net med og uden batterier vil blive påvirket af en fejl på nettet. Samt hvad andelen af batterier gør i forhold til systemstabiliteten.</a:t>
+            </a:r>
+          </a:p>
+          <a:p>
+            <a:r>
+              <a:rPr lang="da-DK" b="1" baseline="0" dirty="0"/>
+              <a:t>2: </a:t>
+            </a:r>
+            <a:r>
+              <a:rPr lang="da-DK" baseline="0" dirty="0"/>
+              <a:t>Undersøgelse af hvordan batterier kan bidrage til absorbere overproduktion og derved for systemet ligne en belastning der skaber balance i systemet igen.</a:t>
+            </a:r>
+          </a:p>
+          <a:p>
+            <a:r>
+              <a:rPr lang="da-DK" b="1" baseline="0" dirty="0"/>
+              <a:t>3: </a:t>
+            </a:r>
+            <a:r>
+              <a:rPr lang="da-DK" baseline="0" dirty="0"/>
+              <a:t>Det omvendte tilfælde hvor batterier skal kunne kompensere for den tabte forsyning og derved fungere som en forsyningskilde.</a:t>
+            </a:r>
+          </a:p>
+          <a:p>
+            <a:r>
+              <a:rPr lang="da-DK" b="1" baseline="0" dirty="0"/>
+              <a:t>4: </a:t>
+            </a:r>
+            <a:r>
+              <a:rPr lang="da-DK" baseline="0" dirty="0"/>
+              <a:t>En undersøgelse af hvilke forskel placeringen af batterierne betyder og om der eventuel er en af løsningerne der mere fordelagtig, når der fokuseres på den overordnede systemstabilitet.</a:t>
+            </a:r>
+          </a:p>
+          <a:p>
+            <a:r>
+              <a:rPr lang="da-DK" baseline="0" dirty="0"/>
+              <a:t>Alle casene er blevet udført undersøgt på short term basis og kun for statiske tilfælde. Dvs. fejl, produktionsregulering eller belastningsændringer består af udkoblinger eller indkoblinger.</a:t>
+            </a:r>
+          </a:p>
+          <a:p>
+            <a:endParaRPr lang="da-DK" baseline="0" dirty="0"/>
           </a:p>
           <a:p>
             <a:endParaRPr lang="da-DK" dirty="0"/>
@@ -654,20 +693,60 @@
           <a:lstStyle/>
           <a:p>
             <a:r>
-              <a:rPr lang="da-DK" dirty="0" smtClean="0"/>
+              <a:rPr lang="da-DK" b="1" dirty="0"/>
               <a:t>Frekvens –</a:t>
             </a:r>
             <a:r>
-              <a:rPr lang="da-DK" baseline="0" dirty="0" smtClean="0"/>
+              <a:rPr lang="da-DK" b="1" baseline="0" dirty="0"/>
               <a:t> Laurids</a:t>
             </a:r>
           </a:p>
           <a:p>
-            <a:endParaRPr lang="da-DK" baseline="0" dirty="0" smtClean="0"/>
-          </a:p>
-          <a:p>
-            <a:r>
-              <a:rPr lang="da-DK" baseline="0" dirty="0" smtClean="0"/>
+            <a:r>
+              <a:rPr lang="da-DK" b="1" baseline="0" dirty="0"/>
+              <a:t>Reguleringsreserve: </a:t>
+            </a:r>
+            <a:r>
+              <a:rPr lang="da-DK" baseline="0" dirty="0"/>
+              <a:t>Den måde vi anser batterier i projektet er som en reguleringsreserve der har relativt hurtig responstid og derfor kan fungere som primær reserve såvel som sekundær reserve.</a:t>
+            </a:r>
+          </a:p>
+          <a:p>
+            <a:r>
+              <a:rPr lang="da-DK" b="1" baseline="0" dirty="0"/>
+              <a:t>Overproduktion: </a:t>
+            </a:r>
+            <a:r>
+              <a:rPr lang="da-DK" baseline="0" dirty="0"/>
+              <a:t>Derved var forventningen at batterierne ved overproduktion kan kompensere og derved formindske frekvensstigningen og derefter genskabe den nominelle systemfrekvens.</a:t>
+            </a:r>
+          </a:p>
+          <a:p>
+            <a:r>
+              <a:rPr lang="da-DK" b="1" baseline="0" dirty="0"/>
+              <a:t>Underproduktion: </a:t>
+            </a:r>
+            <a:r>
+              <a:rPr lang="da-DK" baseline="0" dirty="0"/>
+              <a:t>For underproduktion var forventningen at batterier vil kunne kompensere for den tabte produktion og derved mindske frekvensfaldet og genskabe den nominelle systemfrekvens.</a:t>
+            </a:r>
+          </a:p>
+          <a:p>
+            <a:r>
+              <a:rPr lang="da-DK" b="1" baseline="0" dirty="0"/>
+              <a:t>Batteriandel: </a:t>
+            </a:r>
+            <a:r>
+              <a:rPr lang="da-DK" baseline="0" dirty="0"/>
+              <a:t>Når det er sagt forventes det at andelen af batteri vil have betyde for frekvensudsving, da systemet inerti vil blive mindre med en reducering af produktion fra synkrone enheder. Placeringen af batterier forventes ikke at være betydelig for frekvensstabiliteten.</a:t>
+            </a:r>
+          </a:p>
+          <a:p>
+            <a:endParaRPr lang="da-DK" baseline="0" dirty="0"/>
+          </a:p>
+          <a:p>
+            <a:r>
+              <a:rPr lang="da-DK" baseline="0" dirty="0"/>
               <a:t>Spænding – Jeppe</a:t>
             </a:r>
           </a:p>
@@ -758,19 +837,14 @@
           <a:p>
             <a:pPr lvl="0"/>
             <a:r>
-              <a:rPr lang="da-DK" b="1" dirty="0" smtClean="0"/>
-              <a:t>Produktions og </a:t>
-            </a:r>
-            <a:r>
-              <a:rPr lang="da-DK" b="1" dirty="0" smtClean="0"/>
-              <a:t>belastningsdata - Jeppe</a:t>
-            </a:r>
-            <a:endParaRPr lang="da-DK" b="1" dirty="0" smtClean="0"/>
+              <a:rPr lang="da-DK" b="1" dirty="0"/>
+              <a:t>Produktions og belastningsdata - Jeppe</a:t>
+            </a:r>
           </a:p>
           <a:p>
             <a:pPr lvl="0"/>
             <a:r>
-              <a:rPr lang="da-DK" dirty="0" smtClean="0"/>
+              <a:rPr lang="da-DK" dirty="0"/>
               <a:t>Data fra energinet:</a:t>
             </a:r>
           </a:p>
@@ -793,47 +867,47 @@
               <a:defRPr/>
             </a:pPr>
             <a:r>
-              <a:rPr lang="da-DK" dirty="0" smtClean="0"/>
+              <a:rPr lang="da-DK" dirty="0"/>
               <a:t>Fossil vs </a:t>
             </a:r>
             <a:r>
-              <a:rPr lang="da-DK" dirty="0" err="1" smtClean="0"/>
+              <a:rPr lang="da-DK" dirty="0" err="1"/>
               <a:t>renewable</a:t>
             </a:r>
             <a:r>
-              <a:rPr lang="da-DK" dirty="0" smtClean="0"/>
+              <a:rPr lang="da-DK" dirty="0"/>
               <a:t> energi, Solcelle </a:t>
             </a:r>
           </a:p>
           <a:p>
             <a:pPr lvl="0"/>
             <a:r>
-              <a:rPr lang="da-DK" dirty="0" smtClean="0"/>
+              <a:rPr lang="da-DK" dirty="0"/>
               <a:t>Belastning</a:t>
             </a:r>
           </a:p>
           <a:p>
             <a:pPr lvl="0"/>
             <a:r>
-              <a:rPr lang="da-DK" dirty="0" smtClean="0"/>
+              <a:rPr lang="da-DK" dirty="0"/>
               <a:t>Maks belastning</a:t>
             </a:r>
             <a:r>
-              <a:rPr lang="da-DK" baseline="0" dirty="0" smtClean="0"/>
+              <a:rPr lang="da-DK" baseline="0" dirty="0"/>
               <a:t> / </a:t>
             </a:r>
             <a:r>
-              <a:rPr lang="da-DK" baseline="0" dirty="0" err="1" smtClean="0"/>
+              <a:rPr lang="da-DK" baseline="0" dirty="0" err="1"/>
               <a:t>worst</a:t>
             </a:r>
             <a:r>
-              <a:rPr lang="da-DK" baseline="0" dirty="0" smtClean="0"/>
+              <a:rPr lang="da-DK" baseline="0" dirty="0"/>
               <a:t> case</a:t>
             </a:r>
           </a:p>
           <a:p>
             <a:pPr lvl="0"/>
-            <a:endParaRPr lang="da-DK" dirty="0" smtClean="0"/>
+            <a:endParaRPr lang="da-DK" dirty="0"/>
           </a:p>
           <a:p>
             <a:pPr marL="0" marR="0" lvl="0" indent="0" algn="l" defTabSz="914400" rtl="0" eaLnBrk="1" fontAlgn="auto" latinLnBrk="0" hangingPunct="1">
@@ -854,14 +928,9 @@
               <a:defRPr/>
             </a:pPr>
             <a:r>
-              <a:rPr lang="da-DK" b="1" dirty="0" smtClean="0"/>
-              <a:t>Typiske </a:t>
-            </a:r>
-            <a:r>
-              <a:rPr lang="da-DK" b="1" dirty="0" smtClean="0"/>
-              <a:t>hustandsbatterier - Jeppe</a:t>
-            </a:r>
-            <a:endParaRPr lang="da-DK" b="1" dirty="0" smtClean="0"/>
+              <a:rPr lang="da-DK" b="1" dirty="0"/>
+              <a:t>Typiske hustandsbatterier - Jeppe</a:t>
+            </a:r>
           </a:p>
           <a:p>
             <a:pPr marL="0" marR="0" lvl="0" indent="0" algn="l" defTabSz="914400" rtl="0" eaLnBrk="1" fontAlgn="auto" latinLnBrk="0" hangingPunct="1">
@@ -882,30 +951,30 @@
               <a:defRPr/>
             </a:pPr>
             <a:r>
-              <a:rPr lang="da-DK" b="0" dirty="0" smtClean="0"/>
+              <a:rPr lang="da-DK" b="0" dirty="0"/>
               <a:t>Fandt</a:t>
             </a:r>
             <a:r>
-              <a:rPr lang="da-DK" b="0" baseline="0" dirty="0" smtClean="0"/>
+              <a:rPr lang="da-DK" b="0" baseline="0" dirty="0"/>
               <a:t> forskellige </a:t>
             </a:r>
             <a:r>
-              <a:rPr lang="da-DK" b="0" baseline="0" dirty="0" err="1" smtClean="0"/>
+              <a:rPr lang="da-DK" b="0" baseline="0" dirty="0" err="1"/>
               <a:t>batteriere</a:t>
             </a:r>
             <a:r>
-              <a:rPr lang="da-DK" b="0" baseline="0" dirty="0" smtClean="0"/>
+              <a:rPr lang="da-DK" b="0" baseline="0" dirty="0"/>
               <a:t>, valgt </a:t>
             </a:r>
             <a:r>
-              <a:rPr lang="da-DK" b="0" baseline="0" dirty="0" err="1" smtClean="0"/>
+              <a:rPr lang="da-DK" b="0" baseline="0" dirty="0" err="1"/>
               <a:t>Tesla</a:t>
             </a:r>
             <a:r>
-              <a:rPr lang="da-DK" b="0" baseline="0" dirty="0" smtClean="0"/>
+              <a:rPr lang="da-DK" b="0" baseline="0" dirty="0"/>
               <a:t> pga. meget information tilgængeligt.</a:t>
             </a:r>
-            <a:endParaRPr lang="da-DK" b="0" dirty="0" smtClean="0"/>
+            <a:endParaRPr lang="da-DK" b="0" dirty="0"/>
           </a:p>
           <a:p>
             <a:pPr marL="0" marR="0" lvl="0" indent="0" algn="l" defTabSz="914400" rtl="0" eaLnBrk="1" fontAlgn="auto" latinLnBrk="0" hangingPunct="1">
@@ -926,27 +995,27 @@
               <a:defRPr/>
             </a:pPr>
             <a:r>
-              <a:rPr lang="da-DK" b="0" dirty="0" err="1" smtClean="0"/>
+              <a:rPr lang="da-DK" b="0" dirty="0" err="1"/>
               <a:t>Teslas</a:t>
             </a:r>
             <a:r>
-              <a:rPr lang="da-DK" b="0" baseline="0" dirty="0" smtClean="0"/>
+              <a:rPr lang="da-DK" b="0" baseline="0" dirty="0"/>
               <a:t> </a:t>
             </a:r>
             <a:r>
-              <a:rPr lang="da-DK" b="0" baseline="0" dirty="0" err="1" smtClean="0"/>
+              <a:rPr lang="da-DK" b="0" baseline="0" dirty="0" err="1"/>
               <a:t>powerwall</a:t>
             </a:r>
             <a:r>
-              <a:rPr lang="da-DK" b="0" baseline="0" dirty="0" smtClean="0"/>
+              <a:rPr lang="da-DK" b="0" baseline="0" dirty="0"/>
               <a:t>, 14kWh kapacitet, </a:t>
             </a:r>
             <a:r>
-              <a:rPr lang="da-DK" b="0" baseline="0" dirty="0" err="1" smtClean="0"/>
+              <a:rPr lang="da-DK" b="0" baseline="0" dirty="0" err="1"/>
               <a:t>maks</a:t>
             </a:r>
             <a:r>
-              <a:rPr lang="da-DK" b="0" baseline="0" dirty="0" smtClean="0"/>
+              <a:rPr lang="da-DK" b="0" baseline="0" dirty="0"/>
               <a:t> belastning 7kW – 5 kW kontinuert.</a:t>
             </a:r>
           </a:p>
@@ -968,67 +1037,104 @@
               <a:tabLst/>
               <a:defRPr/>
             </a:pPr>
-            <a:endParaRPr lang="da-DK" b="0" dirty="0" smtClean="0"/>
+            <a:endParaRPr lang="da-DK" b="0" dirty="0"/>
           </a:p>
           <a:p>
             <a:pPr lvl="0"/>
             <a:r>
-              <a:rPr lang="da-DK" b="1" dirty="0" smtClean="0"/>
+              <a:rPr lang="da-DK" b="1" dirty="0"/>
               <a:t>Modelopbygningen - Jeppe</a:t>
             </a:r>
-            <a:endParaRPr lang="da-DK" b="1" dirty="0" smtClean="0"/>
           </a:p>
           <a:p>
             <a:pPr lvl="0"/>
             <a:r>
-              <a:rPr lang="da-DK" b="0" dirty="0" smtClean="0"/>
+              <a:rPr lang="da-DK" b="0" dirty="0"/>
               <a:t>Skalleringsfaktor</a:t>
             </a:r>
           </a:p>
           <a:p>
             <a:pPr lvl="0"/>
             <a:r>
-              <a:rPr lang="da-DK" b="0" dirty="0" smtClean="0"/>
+              <a:rPr lang="da-DK" b="0" dirty="0"/>
               <a:t>Logisk opbygning af transmission og produktion,</a:t>
             </a:r>
             <a:r>
-              <a:rPr lang="da-DK" b="0" baseline="0" dirty="0" smtClean="0"/>
+              <a:rPr lang="da-DK" b="0" baseline="0" dirty="0"/>
               <a:t> solceller osv.</a:t>
             </a:r>
           </a:p>
           <a:p>
             <a:pPr lvl="0"/>
             <a:r>
-              <a:rPr lang="da-DK" b="0" baseline="0" dirty="0" smtClean="0"/>
+              <a:rPr lang="da-DK" b="0" baseline="0" dirty="0"/>
               <a:t>Impedanser til transformer, linjer, generatorer osv.</a:t>
             </a:r>
-            <a:endParaRPr lang="da-DK" b="0" dirty="0" smtClean="0"/>
+            <a:endParaRPr lang="da-DK" b="0" dirty="0"/>
           </a:p>
           <a:p>
             <a:pPr lvl="0"/>
-            <a:endParaRPr lang="da-DK" b="1" dirty="0" smtClean="0"/>
+            <a:endParaRPr lang="da-DK" b="1" dirty="0"/>
           </a:p>
           <a:p>
             <a:pPr lvl="0"/>
-            <a:endParaRPr lang="da-DK" b="1" dirty="0" smtClean="0"/>
+            <a:endParaRPr lang="da-DK" b="1" dirty="0"/>
           </a:p>
           <a:p>
             <a:pPr lvl="0"/>
             <a:r>
-              <a:rPr lang="da-DK" b="1" dirty="0" smtClean="0"/>
+              <a:rPr lang="da-DK" b="1" dirty="0"/>
               <a:t>Simulering – Laurids</a:t>
             </a:r>
           </a:p>
           <a:p>
             <a:pPr lvl="0"/>
             <a:r>
-              <a:rPr lang="da-DK" b="0" dirty="0" smtClean="0"/>
-              <a:t>Kort resultat.</a:t>
+              <a:rPr lang="da-DK" b="1" dirty="0"/>
+              <a:t>1: </a:t>
+            </a:r>
+            <a:r>
+              <a:rPr lang="da-DK" b="0" dirty="0"/>
+              <a:t>Fuld belastning, distributionskabel i ringforsyning udkobles. 4 tilstande: Fra ingen til meget batteri. Mindsker spændingsfald, mindsker frekvensstigning.</a:t>
             </a:r>
           </a:p>
           <a:p>
             <a:pPr lvl="0"/>
-            <a:endParaRPr lang="da-DK" b="1" dirty="0" smtClean="0"/>
+            <a:r>
+              <a:rPr lang="da-DK" b="1" dirty="0"/>
+              <a:t>2: </a:t>
+            </a:r>
+            <a:r>
+              <a:rPr lang="da-DK" b="0" dirty="0"/>
+              <a:t>Fuld belastning, by 2 kobles ud. 2 tilstande: Ingen og kompensation svarende til belastningen fra by 2. Kompenserer fuldstændigt for spændingsstigningen, stabilisere frekvens så man undgå udsvinget og frekvensfaldet man ser i tilstand 1.</a:t>
+            </a:r>
+          </a:p>
+          <a:p>
+            <a:pPr lvl="0"/>
+            <a:r>
+              <a:rPr lang="da-DK" b="1" dirty="0"/>
+              <a:t>3: </a:t>
+            </a:r>
+            <a:r>
+              <a:rPr lang="da-DK" b="0" dirty="0"/>
+              <a:t>Fuld belastning, vindmøllepark kobles ud. 4 tilstande: Fra ingen til meget batteri (byer er selvforsynende fra batteri og solceller). Spændingsstabilitet forbedres markant med større andel batteri indkoblet. Frekvensen stabiliseres ved kompensering med batteri, men en for stor andel gør at produktionstabet vi ser har større påvirkning da vi mangler inerti.</a:t>
+            </a:r>
+          </a:p>
+          <a:p>
+            <a:pPr lvl="0"/>
+            <a:r>
+              <a:rPr lang="da-DK" b="1" dirty="0"/>
+              <a:t>4: </a:t>
+            </a:r>
+            <a:r>
+              <a:rPr lang="da-DK" b="0" dirty="0"/>
+              <a:t>Samme som 3 med central batteri. Meget samme tendens som 3. En anelse dårligere kompensering for spændingsfald i tilstand 4, men en anelse bedre stabilisering af frekvensen.</a:t>
+            </a:r>
+            <a:endParaRPr lang="da-DK" b="1" dirty="0"/>
+          </a:p>
+          <a:p>
+            <a:pPr lvl="0"/>
+            <a:endParaRPr lang="da-DK" b="1" dirty="0"/>
           </a:p>
         </p:txBody>
       </p:sp>
@@ -1113,29 +1219,50 @@
           <a:lstStyle/>
           <a:p>
             <a:r>
-              <a:rPr lang="da-DK" dirty="0" smtClean="0"/>
+              <a:rPr lang="da-DK" b="1" dirty="0"/>
               <a:t>Frekvens – Laurids</a:t>
             </a:r>
           </a:p>
           <a:p>
-            <a:endParaRPr lang="da-DK" dirty="0" smtClean="0"/>
-          </a:p>
-          <a:p>
-            <a:r>
-              <a:rPr lang="da-DK" dirty="0" smtClean="0"/>
+            <a:r>
+              <a:rPr lang="da-DK" b="1" dirty="0"/>
+              <a:t>Belastningsbalancering: </a:t>
+            </a:r>
+            <a:r>
+              <a:rPr lang="da-DK" dirty="0"/>
+              <a:t>Til anvendelse til at balancere belastningsforholdet viser det at have batterier i nettet en klar fordel, da det i alle cases har en positiv effekt på frekvensstabiliteten.</a:t>
+            </a:r>
+          </a:p>
+          <a:p>
+            <a:r>
+              <a:rPr lang="da-DK" b="1" dirty="0"/>
+              <a:t>Overkompensering: </a:t>
+            </a:r>
+            <a:r>
+              <a:rPr lang="da-DK" b="0" dirty="0"/>
+              <a:t>Sådan som simuleringerne er blevet udført i projektet er der i nogle tilstande blevet anvendt overkompensering, ved at batterierne simpelthen ikke bare kompenserer for den fejlen, men også overtager en del af produktionen fra synkron generatoren. I disse tilfælde viser det sig at systemet er meget følsom overfor forstyrrelser og derved har store udsving på frekvensen.</a:t>
+            </a:r>
+            <a:endParaRPr lang="da-DK" b="1" dirty="0"/>
+          </a:p>
+          <a:p>
+            <a:endParaRPr lang="da-DK" dirty="0"/>
+          </a:p>
+          <a:p>
+            <a:r>
+              <a:rPr lang="da-DK" dirty="0"/>
               <a:t>Spænding – Jeppe</a:t>
             </a:r>
           </a:p>
           <a:p>
-            <a:endParaRPr lang="da-DK" dirty="0" smtClean="0"/>
-          </a:p>
-          <a:p>
-            <a:r>
-              <a:rPr lang="da-DK" dirty="0" smtClean="0"/>
+            <a:endParaRPr lang="da-DK" dirty="0"/>
+          </a:p>
+          <a:p>
+            <a:r>
+              <a:rPr lang="da-DK" dirty="0"/>
               <a:t>Centralbatteri</a:t>
             </a:r>
             <a:r>
-              <a:rPr lang="da-DK" baseline="0" dirty="0" smtClean="0"/>
+              <a:rPr lang="da-DK" baseline="0" dirty="0"/>
               <a:t> - Jeppe</a:t>
             </a:r>
             <a:endParaRPr lang="da-DK" dirty="0"/>
@@ -1223,18 +1350,13 @@
           <a:lstStyle/>
           <a:p>
             <a:r>
-              <a:rPr lang="da-DK" b="1" dirty="0" smtClean="0"/>
-              <a:t>Reaktiv </a:t>
-            </a:r>
-            <a:r>
-              <a:rPr lang="da-DK" b="1" dirty="0" smtClean="0"/>
-              <a:t>energi - Jeppe</a:t>
-            </a:r>
-            <a:endParaRPr lang="da-DK" b="1" dirty="0" smtClean="0"/>
-          </a:p>
-          <a:p>
-            <a:r>
-              <a:rPr lang="da-DK" dirty="0" smtClean="0"/>
+              <a:rPr lang="da-DK" b="1" dirty="0"/>
+              <a:t>Reaktiv energi - Jeppe</a:t>
+            </a:r>
+          </a:p>
+          <a:p>
+            <a:r>
+              <a:rPr lang="da-DK" dirty="0"/>
               <a:t>Vi har ikke fokuseret nok på det. </a:t>
             </a:r>
           </a:p>
@@ -1244,7 +1366,7 @@
               <a:buChar char="-"/>
             </a:pPr>
             <a:r>
-              <a:rPr lang="da-DK" baseline="0" dirty="0" smtClean="0"/>
+              <a:rPr lang="da-DK" baseline="0" dirty="0"/>
               <a:t>Undersøge hvor meget batterierne kan levere</a:t>
             </a:r>
           </a:p>
@@ -1254,7 +1376,7 @@
               <a:buChar char="-"/>
             </a:pPr>
             <a:r>
-              <a:rPr lang="da-DK" dirty="0" smtClean="0"/>
+              <a:rPr lang="da-DK" dirty="0"/>
               <a:t>Undersøge den reaktive effekt påvirkning af spændingsstabiliteten</a:t>
             </a:r>
           </a:p>
@@ -1263,7 +1385,7 @@
               <a:buFontTx/>
               <a:buNone/>
             </a:pPr>
-            <a:endParaRPr lang="da-DK" baseline="0" dirty="0" smtClean="0"/>
+            <a:endParaRPr lang="da-DK" baseline="0" dirty="0"/>
           </a:p>
           <a:p>
             <a:pPr marL="0" indent="0">
@@ -1271,14 +1393,9 @@
               <a:buNone/>
             </a:pPr>
             <a:r>
-              <a:rPr lang="da-DK" b="1" baseline="0" dirty="0" smtClean="0"/>
-              <a:t>Frekvens </a:t>
-            </a:r>
-            <a:r>
-              <a:rPr lang="da-DK" b="1" baseline="0" dirty="0" smtClean="0"/>
-              <a:t>simuleringen - Laurids</a:t>
-            </a:r>
-            <a:endParaRPr lang="da-DK" b="1" baseline="0" dirty="0" smtClean="0"/>
+              <a:rPr lang="da-DK" b="1" baseline="0" dirty="0"/>
+              <a:t>Frekvenssimuleringen - Laurids</a:t>
+            </a:r>
           </a:p>
           <a:p>
             <a:pPr marL="0" indent="0">
@@ -1286,8 +1403,8 @@
               <a:buNone/>
             </a:pPr>
             <a:r>
-              <a:rPr lang="da-DK" b="0" baseline="0" dirty="0" smtClean="0"/>
-              <a:t>Hvorfor den stikker af i de retninger den gør. Belastning der er spændingsafhængig, i forhold til produktion</a:t>
+              <a:rPr lang="da-DK" b="0" baseline="0" dirty="0"/>
+              <a:t>Hvorfor den stikker af i de retninger den gør -&gt; Vi havde forventet at se svingninger og en frekvens der vil stabilisere sig på et nyt arbejdspunkt.</a:t>
             </a:r>
           </a:p>
           <a:p>
@@ -1295,22 +1412,25 @@
               <a:buFontTx/>
               <a:buNone/>
             </a:pPr>
-            <a:endParaRPr lang="da-DK" b="0" baseline="0" dirty="0" smtClean="0"/>
+            <a:r>
+              <a:rPr lang="da-DK" b="0" baseline="0" dirty="0"/>
+              <a:t>Belastning der er spændingsafhængig, i forhold til produktion -&gt; I nogle simulering ses knæk som vist på den nederst figur. Disse skyldes at belastningerne i </a:t>
+            </a:r>
+            <a:r>
+              <a:rPr lang="da-DK" b="0" baseline="0" dirty="0" err="1"/>
+              <a:t>PowerFactory</a:t>
+            </a:r>
+            <a:r>
+              <a:rPr lang="da-DK" b="0" baseline="0" dirty="0"/>
+              <a:t> simulering er spændingsafhængige og at reference maskinen vil tilpasse sig belastningen i simuleringen og har indbygget en standard regulering.</a:t>
+            </a:r>
           </a:p>
           <a:p>
             <a:pPr marL="0" indent="0">
               <a:buFontTx/>
               <a:buNone/>
             </a:pPr>
-            <a:r>
-              <a:rPr lang="da-DK" b="1" baseline="0" dirty="0" smtClean="0"/>
-              <a:t>Regulering i </a:t>
-            </a:r>
-            <a:r>
-              <a:rPr lang="da-DK" b="1" baseline="0" dirty="0" smtClean="0"/>
-              <a:t>modellen - Laurids</a:t>
-            </a:r>
-            <a:endParaRPr lang="da-DK" b="1" baseline="0" dirty="0" smtClean="0"/>
+            <a:endParaRPr lang="da-DK" b="0" baseline="0" dirty="0"/>
           </a:p>
           <a:p>
             <a:pPr marL="0" indent="0">
@@ -1318,8 +1438,8 @@
               <a:buNone/>
             </a:pPr>
             <a:r>
-              <a:rPr lang="da-DK" b="0" baseline="0" dirty="0" smtClean="0"/>
-              <a:t>Der er ikke implementeret udover den generelle regulering i referencemaskinen. Burde kunne laves, men er ikke lykkes.</a:t>
+              <a:rPr lang="da-DK" b="1" baseline="0" dirty="0"/>
+              <a:t>Regulering i modellen - Laurids</a:t>
             </a:r>
           </a:p>
           <a:p>
@@ -1327,7 +1447,10 @@
               <a:buFontTx/>
               <a:buNone/>
             </a:pPr>
-            <a:endParaRPr lang="da-DK" b="0" baseline="0" dirty="0" smtClean="0"/>
+            <a:r>
+              <a:rPr lang="da-DK" b="0" baseline="0" dirty="0"/>
+              <a:t>Der er ikke implementeret regulering udover den generelle regulering i referencemaskinen. Burde kunne laves, men er ikke lykkedes.</a:t>
+            </a:r>
           </a:p>
           <a:p>
             <a:pPr marL="0" indent="0">
@@ -1335,24 +1458,16 @@
               <a:buNone/>
             </a:pPr>
             <a:r>
-              <a:rPr lang="da-DK" b="1" baseline="0" dirty="0" smtClean="0"/>
-              <a:t>Simplificeret </a:t>
-            </a:r>
-            <a:r>
-              <a:rPr lang="da-DK" b="1" baseline="0" dirty="0" smtClean="0"/>
-              <a:t>model - Laurids</a:t>
-            </a:r>
-            <a:endParaRPr lang="da-DK" b="1" baseline="0" dirty="0" smtClean="0"/>
+              <a:rPr lang="da-DK" b="0" baseline="0" dirty="0"/>
+              <a:t>Det selvfølgelig et element der vil være relevant at kunne kontrollere og derved opnå et mere reelt billede af hvordan batterier kan aktiveres som reguleringsreserve.</a:t>
+            </a:r>
           </a:p>
           <a:p>
             <a:pPr marL="0" indent="0">
               <a:buFontTx/>
               <a:buNone/>
             </a:pPr>
-            <a:r>
-              <a:rPr lang="da-DK" b="0" baseline="0" dirty="0" smtClean="0"/>
-              <a:t>Hele modellen er simplificeret, et forsøg på at lave noget der lignede et udsnit af Danmark.</a:t>
-            </a:r>
+            <a:endParaRPr lang="da-DK" b="0" baseline="0" dirty="0"/>
           </a:p>
           <a:p>
             <a:pPr marL="0" indent="0">
@@ -1360,16 +1475,8 @@
               <a:buNone/>
             </a:pPr>
             <a:r>
-              <a:rPr lang="da-DK" b="0" baseline="0" dirty="0" smtClean="0"/>
-              <a:t>Simplificeret transformere, generatorer, linjer, </a:t>
-            </a:r>
-            <a:r>
-              <a:rPr lang="da-DK" b="0" baseline="0" dirty="0" err="1" smtClean="0"/>
-              <a:t>netopbygningen</a:t>
-            </a:r>
-            <a:r>
-              <a:rPr lang="da-DK" b="0" baseline="0" dirty="0" smtClean="0"/>
-              <a:t>.</a:t>
+              <a:rPr lang="da-DK" b="1" baseline="0" dirty="0"/>
+              <a:t>Simplificeret model - Laurids</a:t>
             </a:r>
           </a:p>
           <a:p>
@@ -1377,7 +1484,55 @@
               <a:buFontTx/>
               <a:buNone/>
             </a:pPr>
-            <a:endParaRPr lang="da-DK" b="0" baseline="0" dirty="0" smtClean="0"/>
+            <a:r>
+              <a:rPr lang="da-DK" b="0" baseline="0" dirty="0"/>
+              <a:t>Hele modellen er simplificeret, et forsøg på at lave noget der lignede et udsnit af Danmark.</a:t>
+            </a:r>
+          </a:p>
+          <a:p>
+            <a:pPr marL="0" indent="0">
+              <a:buFontTx/>
+              <a:buNone/>
+            </a:pPr>
+            <a:r>
+              <a:rPr lang="da-DK" b="0" baseline="0" dirty="0"/>
+              <a:t>Simplificeret transformere, generatorer, linjer, </a:t>
+            </a:r>
+            <a:r>
+              <a:rPr lang="da-DK" b="0" baseline="0" dirty="0" err="1"/>
+              <a:t>netopbygningen</a:t>
+            </a:r>
+            <a:r>
+              <a:rPr lang="da-DK" b="0" baseline="0" dirty="0"/>
+              <a:t>.</a:t>
+            </a:r>
+          </a:p>
+          <a:p>
+            <a:pPr marL="0" indent="0">
+              <a:buFontTx/>
+              <a:buNone/>
+            </a:pPr>
+            <a:r>
+              <a:rPr lang="da-DK" b="0" baseline="0" dirty="0"/>
+              <a:t>Dette er anledning til nogle fejlkilder og usikkerheder, men det havde simpelthen været for tidskrævende at gøre modellen mere kompleks.</a:t>
+            </a:r>
+          </a:p>
+          <a:p>
+            <a:pPr marL="0" indent="0">
+              <a:buFontTx/>
+              <a:buNone/>
+            </a:pPr>
+            <a:r>
+              <a:rPr lang="da-DK" b="0" baseline="0" dirty="0"/>
+              <a:t>Til et nyt studie vil det måske være relevant at opdele frekvens- og spændingsstabilitetsstudiet i to, hvor frekvensundersøgelse vil kunne laves på en simplificeret model på samme tilkoblingsbus og spændingsundersøgelsen vil kunne laves på mindre et udsnit af et reelt distributionsnet.</a:t>
+            </a:r>
+          </a:p>
+          <a:p>
+            <a:pPr marL="0" indent="0">
+              <a:buFontTx/>
+              <a:buNone/>
+            </a:pPr>
+            <a:endParaRPr lang="da-DK" b="0" baseline="0" dirty="0"/>
           </a:p>
         </p:txBody>
       </p:sp>
@@ -1459,7 +1614,7 @@
           </a:lstStyle>
           <a:p>
             <a:r>
-              <a:rPr lang="da-DK" smtClean="0"/>
+              <a:rPr lang="da-DK"/>
               <a:t>Klik for at redigere i master</a:t>
             </a:r>
             <a:endParaRPr lang="en-US"/>
@@ -1524,7 +1679,7 @@
           </a:lstStyle>
           <a:p>
             <a:r>
-              <a:rPr lang="da-DK" smtClean="0"/>
+              <a:rPr lang="da-DK"/>
               <a:t>Klik for at redigere undertiteltypografien i masteren</a:t>
             </a:r>
             <a:endParaRPr lang="en-US"/>
@@ -1642,7 +1797,7 @@
           <a:lstStyle/>
           <a:p>
             <a:r>
-              <a:rPr lang="da-DK" smtClean="0"/>
+              <a:rPr lang="da-DK"/>
               <a:t>Klik for at redigere i master</a:t>
             </a:r>
             <a:endParaRPr lang="en-US"/>
@@ -1666,35 +1821,35 @@
           <a:p>
             <a:pPr lvl="0"/>
             <a:r>
-              <a:rPr lang="da-DK" smtClean="0"/>
+              <a:rPr lang="da-DK"/>
               <a:t>Rediger typografien i masterens</a:t>
             </a:r>
           </a:p>
           <a:p>
             <a:pPr lvl="1"/>
             <a:r>
-              <a:rPr lang="da-DK" smtClean="0"/>
+              <a:rPr lang="da-DK"/>
               <a:t>Andet niveau</a:t>
             </a:r>
           </a:p>
           <a:p>
             <a:pPr lvl="2"/>
             <a:r>
-              <a:rPr lang="da-DK" smtClean="0"/>
+              <a:rPr lang="da-DK"/>
               <a:t>Tredje niveau</a:t>
             </a:r>
           </a:p>
           <a:p>
             <a:pPr lvl="3"/>
             <a:r>
-              <a:rPr lang="da-DK" smtClean="0"/>
+              <a:rPr lang="da-DK"/>
               <a:t>Fjerde niveau</a:t>
             </a:r>
           </a:p>
           <a:p>
             <a:pPr lvl="4"/>
             <a:r>
-              <a:rPr lang="da-DK" smtClean="0"/>
+              <a:rPr lang="da-DK"/>
               <a:t>Femte niveau</a:t>
             </a:r>
             <a:endParaRPr lang="en-US"/>
@@ -1817,7 +1972,7 @@
           <a:lstStyle/>
           <a:p>
             <a:r>
-              <a:rPr lang="da-DK" smtClean="0"/>
+              <a:rPr lang="da-DK"/>
               <a:t>Klik for at redigere i master</a:t>
             </a:r>
             <a:endParaRPr lang="en-US"/>
@@ -1846,35 +2001,35 @@
           <a:p>
             <a:pPr lvl="0"/>
             <a:r>
-              <a:rPr lang="da-DK" smtClean="0"/>
+              <a:rPr lang="da-DK"/>
               <a:t>Rediger typografien i masterens</a:t>
             </a:r>
           </a:p>
           <a:p>
             <a:pPr lvl="1"/>
             <a:r>
-              <a:rPr lang="da-DK" smtClean="0"/>
+              <a:rPr lang="da-DK"/>
               <a:t>Andet niveau</a:t>
             </a:r>
           </a:p>
           <a:p>
             <a:pPr lvl="2"/>
             <a:r>
-              <a:rPr lang="da-DK" smtClean="0"/>
+              <a:rPr lang="da-DK"/>
               <a:t>Tredje niveau</a:t>
             </a:r>
           </a:p>
           <a:p>
             <a:pPr lvl="3"/>
             <a:r>
-              <a:rPr lang="da-DK" smtClean="0"/>
+              <a:rPr lang="da-DK"/>
               <a:t>Fjerde niveau</a:t>
             </a:r>
           </a:p>
           <a:p>
             <a:pPr lvl="4"/>
             <a:r>
-              <a:rPr lang="da-DK" smtClean="0"/>
+              <a:rPr lang="da-DK"/>
               <a:t>Femte niveau</a:t>
             </a:r>
             <a:endParaRPr lang="en-US"/>
@@ -1992,7 +2147,7 @@
           <a:lstStyle/>
           <a:p>
             <a:r>
-              <a:rPr lang="da-DK" smtClean="0"/>
+              <a:rPr lang="da-DK"/>
               <a:t>Klik for at redigere i master</a:t>
             </a:r>
             <a:endParaRPr lang="en-US"/>
@@ -2016,35 +2171,35 @@
           <a:p>
             <a:pPr lvl="0"/>
             <a:r>
-              <a:rPr lang="da-DK" smtClean="0"/>
+              <a:rPr lang="da-DK"/>
               <a:t>Rediger typografien i masterens</a:t>
             </a:r>
           </a:p>
           <a:p>
             <a:pPr lvl="1"/>
             <a:r>
-              <a:rPr lang="da-DK" smtClean="0"/>
+              <a:rPr lang="da-DK"/>
               <a:t>Andet niveau</a:t>
             </a:r>
           </a:p>
           <a:p>
             <a:pPr lvl="2"/>
             <a:r>
-              <a:rPr lang="da-DK" smtClean="0"/>
+              <a:rPr lang="da-DK"/>
               <a:t>Tredje niveau</a:t>
             </a:r>
           </a:p>
           <a:p>
             <a:pPr lvl="3"/>
             <a:r>
-              <a:rPr lang="da-DK" smtClean="0"/>
+              <a:rPr lang="da-DK"/>
               <a:t>Fjerde niveau</a:t>
             </a:r>
           </a:p>
           <a:p>
             <a:pPr lvl="4"/>
             <a:r>
-              <a:rPr lang="da-DK" smtClean="0"/>
+              <a:rPr lang="da-DK"/>
               <a:t>Femte niveau</a:t>
             </a:r>
             <a:endParaRPr lang="en-US"/>
@@ -2171,7 +2326,7 @@
           </a:lstStyle>
           <a:p>
             <a:r>
-              <a:rPr lang="da-DK" smtClean="0"/>
+              <a:rPr lang="da-DK"/>
               <a:t>Klik for at redigere i master</a:t>
             </a:r>
             <a:endParaRPr lang="en-US"/>
@@ -2291,7 +2446,7 @@
           <a:p>
             <a:pPr lvl="0"/>
             <a:r>
-              <a:rPr lang="da-DK" smtClean="0"/>
+              <a:rPr lang="da-DK"/>
               <a:t>Rediger typografien i masterens</a:t>
             </a:r>
           </a:p>
@@ -2408,7 +2563,7 @@
           <a:lstStyle/>
           <a:p>
             <a:r>
-              <a:rPr lang="da-DK" smtClean="0"/>
+              <a:rPr lang="da-DK"/>
               <a:t>Klik for at redigere i master</a:t>
             </a:r>
             <a:endParaRPr lang="en-US"/>
@@ -2437,35 +2592,35 @@
           <a:p>
             <a:pPr lvl="0"/>
             <a:r>
-              <a:rPr lang="da-DK" smtClean="0"/>
+              <a:rPr lang="da-DK"/>
               <a:t>Rediger typografien i masterens</a:t>
             </a:r>
           </a:p>
           <a:p>
             <a:pPr lvl="1"/>
             <a:r>
-              <a:rPr lang="da-DK" smtClean="0"/>
+              <a:rPr lang="da-DK"/>
               <a:t>Andet niveau</a:t>
             </a:r>
           </a:p>
           <a:p>
             <a:pPr lvl="2"/>
             <a:r>
-              <a:rPr lang="da-DK" smtClean="0"/>
+              <a:rPr lang="da-DK"/>
               <a:t>Tredje niveau</a:t>
             </a:r>
           </a:p>
           <a:p>
             <a:pPr lvl="3"/>
             <a:r>
-              <a:rPr lang="da-DK" smtClean="0"/>
+              <a:rPr lang="da-DK"/>
               <a:t>Fjerde niveau</a:t>
             </a:r>
           </a:p>
           <a:p>
             <a:pPr lvl="4"/>
             <a:r>
-              <a:rPr lang="da-DK" smtClean="0"/>
+              <a:rPr lang="da-DK"/>
               <a:t>Femte niveau</a:t>
             </a:r>
             <a:endParaRPr lang="en-US"/>
@@ -2494,35 +2649,35 @@
           <a:p>
             <a:pPr lvl="0"/>
             <a:r>
-              <a:rPr lang="da-DK" smtClean="0"/>
+              <a:rPr lang="da-DK"/>
               <a:t>Rediger typografien i masterens</a:t>
             </a:r>
           </a:p>
           <a:p>
             <a:pPr lvl="1"/>
             <a:r>
-              <a:rPr lang="da-DK" smtClean="0"/>
+              <a:rPr lang="da-DK"/>
               <a:t>Andet niveau</a:t>
             </a:r>
           </a:p>
           <a:p>
             <a:pPr lvl="2"/>
             <a:r>
-              <a:rPr lang="da-DK" smtClean="0"/>
+              <a:rPr lang="da-DK"/>
               <a:t>Tredje niveau</a:t>
             </a:r>
           </a:p>
           <a:p>
             <a:pPr lvl="3"/>
             <a:r>
-              <a:rPr lang="da-DK" smtClean="0"/>
+              <a:rPr lang="da-DK"/>
               <a:t>Fjerde niveau</a:t>
             </a:r>
           </a:p>
           <a:p>
             <a:pPr lvl="4"/>
             <a:r>
-              <a:rPr lang="da-DK" smtClean="0"/>
+              <a:rPr lang="da-DK"/>
               <a:t>Femte niveau</a:t>
             </a:r>
             <a:endParaRPr lang="en-US"/>
@@ -2645,7 +2800,7 @@
           <a:lstStyle/>
           <a:p>
             <a:r>
-              <a:rPr lang="da-DK" smtClean="0"/>
+              <a:rPr lang="da-DK"/>
               <a:t>Klik for at redigere i master</a:t>
             </a:r>
             <a:endParaRPr lang="en-US"/>
@@ -2711,7 +2866,7 @@
           <a:p>
             <a:pPr lvl="0"/>
             <a:r>
-              <a:rPr lang="da-DK" smtClean="0"/>
+              <a:rPr lang="da-DK"/>
               <a:t>Rediger typografien i masterens</a:t>
             </a:r>
           </a:p>
@@ -2739,35 +2894,35 @@
           <a:p>
             <a:pPr lvl="0"/>
             <a:r>
-              <a:rPr lang="da-DK" smtClean="0"/>
+              <a:rPr lang="da-DK"/>
               <a:t>Rediger typografien i masterens</a:t>
             </a:r>
           </a:p>
           <a:p>
             <a:pPr lvl="1"/>
             <a:r>
-              <a:rPr lang="da-DK" smtClean="0"/>
+              <a:rPr lang="da-DK"/>
               <a:t>Andet niveau</a:t>
             </a:r>
           </a:p>
           <a:p>
             <a:pPr lvl="2"/>
             <a:r>
-              <a:rPr lang="da-DK" smtClean="0"/>
+              <a:rPr lang="da-DK"/>
               <a:t>Tredje niveau</a:t>
             </a:r>
           </a:p>
           <a:p>
             <a:pPr lvl="3"/>
             <a:r>
-              <a:rPr lang="da-DK" smtClean="0"/>
+              <a:rPr lang="da-DK"/>
               <a:t>Fjerde niveau</a:t>
             </a:r>
           </a:p>
           <a:p>
             <a:pPr lvl="4"/>
             <a:r>
-              <a:rPr lang="da-DK" smtClean="0"/>
+              <a:rPr lang="da-DK"/>
               <a:t>Femte niveau</a:t>
             </a:r>
             <a:endParaRPr lang="en-US"/>
@@ -2833,7 +2988,7 @@
           <a:p>
             <a:pPr lvl="0"/>
             <a:r>
-              <a:rPr lang="da-DK" smtClean="0"/>
+              <a:rPr lang="da-DK"/>
               <a:t>Rediger typografien i masterens</a:t>
             </a:r>
           </a:p>
@@ -2861,35 +3016,35 @@
           <a:p>
             <a:pPr lvl="0"/>
             <a:r>
-              <a:rPr lang="da-DK" smtClean="0"/>
+              <a:rPr lang="da-DK"/>
               <a:t>Rediger typografien i masterens</a:t>
             </a:r>
           </a:p>
           <a:p>
             <a:pPr lvl="1"/>
             <a:r>
-              <a:rPr lang="da-DK" smtClean="0"/>
+              <a:rPr lang="da-DK"/>
               <a:t>Andet niveau</a:t>
             </a:r>
           </a:p>
           <a:p>
             <a:pPr lvl="2"/>
             <a:r>
-              <a:rPr lang="da-DK" smtClean="0"/>
+              <a:rPr lang="da-DK"/>
               <a:t>Tredje niveau</a:t>
             </a:r>
           </a:p>
           <a:p>
             <a:pPr lvl="3"/>
             <a:r>
-              <a:rPr lang="da-DK" smtClean="0"/>
+              <a:rPr lang="da-DK"/>
               <a:t>Fjerde niveau</a:t>
             </a:r>
           </a:p>
           <a:p>
             <a:pPr lvl="4"/>
             <a:r>
-              <a:rPr lang="da-DK" smtClean="0"/>
+              <a:rPr lang="da-DK"/>
               <a:t>Femte niveau</a:t>
             </a:r>
             <a:endParaRPr lang="en-US"/>
@@ -3007,7 +3162,7 @@
           <a:lstStyle/>
           <a:p>
             <a:r>
-              <a:rPr lang="da-DK" smtClean="0"/>
+              <a:rPr lang="da-DK"/>
               <a:t>Klik for at redigere i master</a:t>
             </a:r>
             <a:endParaRPr lang="en-US"/>
@@ -3229,7 +3384,7 @@
           </a:lstStyle>
           <a:p>
             <a:r>
-              <a:rPr lang="da-DK" smtClean="0"/>
+              <a:rPr lang="da-DK"/>
               <a:t>Klik for at redigere i master</a:t>
             </a:r>
             <a:endParaRPr lang="en-US"/>
@@ -3286,35 +3441,35 @@
           <a:p>
             <a:pPr lvl="0"/>
             <a:r>
-              <a:rPr lang="da-DK" smtClean="0"/>
+              <a:rPr lang="da-DK"/>
               <a:t>Rediger typografien i masterens</a:t>
             </a:r>
           </a:p>
           <a:p>
             <a:pPr lvl="1"/>
             <a:r>
-              <a:rPr lang="da-DK" smtClean="0"/>
+              <a:rPr lang="da-DK"/>
               <a:t>Andet niveau</a:t>
             </a:r>
           </a:p>
           <a:p>
             <a:pPr lvl="2"/>
             <a:r>
-              <a:rPr lang="da-DK" smtClean="0"/>
+              <a:rPr lang="da-DK"/>
               <a:t>Tredje niveau</a:t>
             </a:r>
           </a:p>
           <a:p>
             <a:pPr lvl="3"/>
             <a:r>
-              <a:rPr lang="da-DK" smtClean="0"/>
+              <a:rPr lang="da-DK"/>
               <a:t>Fjerde niveau</a:t>
             </a:r>
           </a:p>
           <a:p>
             <a:pPr lvl="4"/>
             <a:r>
-              <a:rPr lang="da-DK" smtClean="0"/>
+              <a:rPr lang="da-DK"/>
               <a:t>Femte niveau</a:t>
             </a:r>
             <a:endParaRPr lang="en-US"/>
@@ -3380,7 +3535,7 @@
           <a:p>
             <a:pPr lvl="0"/>
             <a:r>
-              <a:rPr lang="da-DK" smtClean="0"/>
+              <a:rPr lang="da-DK"/>
               <a:t>Rediger typografien i masterens</a:t>
             </a:r>
           </a:p>
@@ -3506,7 +3661,7 @@
           </a:lstStyle>
           <a:p>
             <a:r>
-              <a:rPr lang="da-DK" smtClean="0"/>
+              <a:rPr lang="da-DK"/>
               <a:t>Klik for at redigere i master</a:t>
             </a:r>
             <a:endParaRPr lang="en-US"/>
@@ -3633,7 +3788,7 @@
           <a:p>
             <a:pPr lvl="0"/>
             <a:r>
-              <a:rPr lang="da-DK" smtClean="0"/>
+              <a:rPr lang="da-DK"/>
               <a:t>Rediger typografien i masterens</a:t>
             </a:r>
           </a:p>
@@ -3765,7 +3920,7 @@
           <a:lstStyle/>
           <a:p>
             <a:r>
-              <a:rPr lang="da-DK" smtClean="0"/>
+              <a:rPr lang="da-DK"/>
               <a:t>Klik for at redigere i master</a:t>
             </a:r>
             <a:endParaRPr lang="en-US"/>
@@ -3799,35 +3954,35 @@
           <a:p>
             <a:pPr lvl="0"/>
             <a:r>
-              <a:rPr lang="da-DK" smtClean="0"/>
+              <a:rPr lang="da-DK"/>
               <a:t>Rediger typografien i masterens</a:t>
             </a:r>
           </a:p>
           <a:p>
             <a:pPr lvl="1"/>
             <a:r>
-              <a:rPr lang="da-DK" smtClean="0"/>
+              <a:rPr lang="da-DK"/>
               <a:t>Andet niveau</a:t>
             </a:r>
           </a:p>
           <a:p>
             <a:pPr lvl="2"/>
             <a:r>
-              <a:rPr lang="da-DK" smtClean="0"/>
+              <a:rPr lang="da-DK"/>
               <a:t>Tredje niveau</a:t>
             </a:r>
           </a:p>
           <a:p>
             <a:pPr lvl="3"/>
             <a:r>
-              <a:rPr lang="da-DK" smtClean="0"/>
+              <a:rPr lang="da-DK"/>
               <a:t>Fjerde niveau</a:t>
             </a:r>
           </a:p>
           <a:p>
             <a:pPr lvl="4"/>
             <a:r>
-              <a:rPr lang="da-DK" smtClean="0"/>
+              <a:rPr lang="da-DK"/>
               <a:t>Femte niveau</a:t>
             </a:r>
             <a:endParaRPr lang="en-US"/>
@@ -4290,26 +4445,25 @@
           <a:lstStyle/>
           <a:p>
             <a:r>
-              <a:rPr lang="da-DK" dirty="0" smtClean="0"/>
+              <a:rPr lang="da-DK" dirty="0"/>
               <a:t>Implementering</a:t>
             </a:r>
             <a:r>
-              <a:rPr lang="en-US" dirty="0" smtClean="0"/>
+              <a:rPr lang="en-US" dirty="0"/>
               <a:t> </a:t>
             </a:r>
             <a:r>
-              <a:rPr lang="en-US" dirty="0" err="1" smtClean="0"/>
+              <a:rPr lang="en-US" dirty="0" err="1"/>
               <a:t>af</a:t>
             </a:r>
             <a:r>
-              <a:rPr lang="en-US" dirty="0" smtClean="0"/>
+              <a:rPr lang="en-US" dirty="0"/>
               <a:t> </a:t>
             </a:r>
             <a:r>
-              <a:rPr lang="da-DK" dirty="0" smtClean="0"/>
+              <a:rPr lang="da-DK" dirty="0"/>
               <a:t>husstandsbatterier</a:t>
             </a:r>
-            <a:endParaRPr lang="da-DK" dirty="0"/>
           </a:p>
         </p:txBody>
       </p:sp>
@@ -4329,43 +4483,42 @@
           <a:lstStyle/>
           <a:p>
             <a:r>
-              <a:rPr lang="en-US" dirty="0" err="1" smtClean="0"/>
+              <a:rPr lang="en-US" dirty="0" err="1"/>
               <a:t>Af</a:t>
             </a:r>
             <a:r>
-              <a:rPr lang="en-US" dirty="0" smtClean="0"/>
+              <a:rPr lang="en-US" dirty="0"/>
               <a:t>:</a:t>
             </a:r>
           </a:p>
           <a:p>
             <a:r>
-              <a:rPr lang="en-US" dirty="0" err="1" smtClean="0"/>
+              <a:rPr lang="en-US" dirty="0" err="1"/>
               <a:t>Laurids</a:t>
             </a:r>
             <a:r>
-              <a:rPr lang="en-US" dirty="0" smtClean="0"/>
+              <a:rPr lang="en-US" dirty="0"/>
               <a:t>  </a:t>
             </a:r>
             <a:r>
-              <a:rPr lang="en-US" dirty="0" err="1" smtClean="0"/>
+              <a:rPr lang="en-US" dirty="0" err="1"/>
               <a:t>Givskov</a:t>
             </a:r>
             <a:r>
-              <a:rPr lang="en-US" dirty="0" smtClean="0"/>
+              <a:rPr lang="en-US" dirty="0"/>
               <a:t> </a:t>
             </a:r>
             <a:r>
-              <a:rPr lang="en-US" dirty="0" err="1" smtClean="0"/>
+              <a:rPr lang="en-US" dirty="0" err="1"/>
               <a:t>Jørgensen</a:t>
             </a:r>
-            <a:endParaRPr lang="en-US" dirty="0" smtClean="0"/>
-          </a:p>
-          <a:p>
-            <a:r>
-              <a:rPr lang="en-US" dirty="0" smtClean="0"/>
+            <a:endParaRPr lang="en-US" dirty="0"/>
+          </a:p>
+          <a:p>
+            <a:r>
+              <a:rPr lang="en-US" dirty="0"/>
               <a:t>Jeppe Hansen</a:t>
             </a:r>
-            <a:endParaRPr lang="en-US" dirty="0"/>
           </a:p>
         </p:txBody>
       </p:sp>
@@ -4420,10 +4573,9 @@
           <a:lstStyle/>
           <a:p>
             <a:r>
-              <a:rPr lang="da-DK" dirty="0" smtClean="0"/>
+              <a:rPr lang="da-DK" dirty="0"/>
               <a:t>Problemformulering</a:t>
             </a:r>
-            <a:endParaRPr lang="da-DK" dirty="0"/>
           </a:p>
         </p:txBody>
       </p:sp>
@@ -4450,16 +4602,16 @@
           <a:lstStyle/>
           <a:p>
             <a:r>
-              <a:rPr lang="da-DK" dirty="0" smtClean="0"/>
+              <a:rPr lang="da-DK" dirty="0"/>
               <a:t>Vedvarende fluktuerende energi</a:t>
             </a:r>
           </a:p>
           <a:p>
-            <a:endParaRPr lang="da-DK" dirty="0" smtClean="0"/>
-          </a:p>
-          <a:p>
-            <a:r>
-              <a:rPr lang="da-DK" dirty="0" smtClean="0"/>
+            <a:endParaRPr lang="da-DK" dirty="0"/>
+          </a:p>
+          <a:p>
+            <a:r>
+              <a:rPr lang="da-DK" dirty="0"/>
               <a:t>Undersøgelse af:</a:t>
             </a:r>
           </a:p>
@@ -4479,11 +4631,7 @@
             </a:r>
             <a:r>
               <a:rPr lang="da-DK" dirty="0"/>
-              <a:t> ved fejl på nettet</a:t>
-            </a:r>
-            <a:r>
-              <a:rPr lang="da-DK" dirty="0" smtClean="0"/>
-              <a:t>.</a:t>
+              <a:t> ved fejl på nettet.</a:t>
             </a:r>
           </a:p>
           <a:p>
@@ -4494,11 +4642,7 @@
             </a:pPr>
             <a:r>
               <a:rPr lang="da-DK" dirty="0"/>
-              <a:t>Husstandsbatteriers evne til at absorbere overproduktion</a:t>
-            </a:r>
-            <a:r>
-              <a:rPr lang="da-DK" dirty="0" smtClean="0"/>
-              <a:t>.</a:t>
+              <a:t>Husstandsbatteriers evne til at absorbere overproduktion.</a:t>
             </a:r>
           </a:p>
           <a:p>
@@ -4509,11 +4653,7 @@
             </a:pPr>
             <a:r>
               <a:rPr lang="da-DK" dirty="0"/>
-              <a:t>Husstandsbatteriers evne til at kompensere for tab af produktion</a:t>
-            </a:r>
-            <a:r>
-              <a:rPr lang="da-DK" dirty="0" smtClean="0"/>
-              <a:t>.</a:t>
+              <a:t>Husstandsbatteriers evne til at kompensere for tab af produktion.</a:t>
             </a:r>
           </a:p>
           <a:p>
@@ -4524,15 +4664,7 @@
             </a:pPr>
             <a:r>
               <a:rPr lang="da-DK" dirty="0"/>
-              <a:t>Husstandsbatteriers </a:t>
-            </a:r>
-            <a:r>
-              <a:rPr lang="da-DK" dirty="0" smtClean="0"/>
-              <a:t>stabiliserende </a:t>
-            </a:r>
-            <a:r>
-              <a:rPr lang="da-DK" dirty="0"/>
-              <a:t>effekt af </a:t>
+              <a:t>Husstandsbatteriers stabiliserende effekt af </a:t>
             </a:r>
             <a:r>
               <a:rPr lang="da-DK" dirty="0" err="1"/>
@@ -4591,84 +4723,83 @@
           <a:lstStyle/>
           <a:p>
             <a:r>
-              <a:rPr lang="da-DK" dirty="0" smtClean="0"/>
-              <a:t>Teori / forventning</a:t>
-            </a:r>
+              <a:rPr lang="da-DK" dirty="0"/>
+              <a:t>Teori og hypotese</a:t>
+            </a:r>
+          </a:p>
+        </p:txBody>
+      </p:sp>
+      <p:sp>
+        <p:nvSpPr>
+          <p:cNvPr id="3" name="Pladsholder til indhold 2"/>
+          <p:cNvSpPr>
+            <a:spLocks noGrp="1"/>
+          </p:cNvSpPr>
+          <p:nvPr>
+            <p:ph idx="1"/>
+          </p:nvPr>
+        </p:nvSpPr>
+        <p:spPr/>
+        <p:txBody>
+          <a:bodyPr/>
+          <a:lstStyle/>
+          <a:p>
+            <a:r>
+              <a:rPr lang="da-DK" dirty="0"/>
+              <a:t>Frekvensstabilitet</a:t>
+            </a:r>
+          </a:p>
+          <a:p>
+            <a:pPr lvl="1"/>
+            <a:r>
+              <a:rPr lang="da-DK" dirty="0"/>
+              <a:t>Reguleringsreserve</a:t>
+            </a:r>
+          </a:p>
+          <a:p>
+            <a:pPr lvl="1"/>
+            <a:r>
+              <a:rPr lang="da-DK" dirty="0"/>
+              <a:t>Overproduktion</a:t>
+            </a:r>
+          </a:p>
+          <a:p>
+            <a:pPr lvl="1"/>
+            <a:r>
+              <a:rPr lang="da-DK" dirty="0"/>
+              <a:t>Underproduktion</a:t>
+            </a:r>
+          </a:p>
+          <a:p>
+            <a:pPr lvl="1"/>
+            <a:r>
+              <a:rPr lang="da-DK" dirty="0"/>
+              <a:t>Batteriandel</a:t>
+            </a:r>
+          </a:p>
+          <a:p>
+            <a:pPr marL="457200" lvl="1" indent="0">
+              <a:buNone/>
+            </a:pPr>
             <a:endParaRPr lang="da-DK" dirty="0"/>
           </a:p>
-        </p:txBody>
-      </p:sp>
-      <p:sp>
-        <p:nvSpPr>
-          <p:cNvPr id="3" name="Pladsholder til indhold 2"/>
-          <p:cNvSpPr>
-            <a:spLocks noGrp="1"/>
-          </p:cNvSpPr>
-          <p:nvPr>
-            <p:ph idx="1"/>
-          </p:nvPr>
-        </p:nvSpPr>
-        <p:spPr/>
-        <p:txBody>
-          <a:bodyPr/>
-          <a:lstStyle/>
-          <a:p>
-            <a:r>
-              <a:rPr lang="da-DK" dirty="0" smtClean="0"/>
-              <a:t>Frekvensstabilitet</a:t>
+          <a:p>
+            <a:r>
+              <a:rPr lang="da-DK" dirty="0"/>
+              <a:t>Spændingsstabilitet</a:t>
             </a:r>
           </a:p>
           <a:p>
             <a:pPr lvl="1"/>
             <a:r>
-              <a:rPr lang="da-DK" dirty="0" smtClean="0"/>
-              <a:t>Reguleringsreserver</a:t>
+              <a:rPr lang="da-DK" dirty="0"/>
+              <a:t>Overspænding</a:t>
             </a:r>
           </a:p>
           <a:p>
             <a:pPr lvl="1"/>
             <a:r>
-              <a:rPr lang="da-DK" dirty="0" smtClean="0"/>
-              <a:t>Overproduktion</a:t>
-            </a:r>
-          </a:p>
-          <a:p>
-            <a:pPr lvl="1"/>
-            <a:r>
-              <a:rPr lang="da-DK" dirty="0" smtClean="0"/>
-              <a:t>Underproduktion</a:t>
-            </a:r>
-          </a:p>
-          <a:p>
-            <a:pPr lvl="1"/>
-            <a:r>
-              <a:rPr lang="da-DK" dirty="0" smtClean="0"/>
-              <a:t>Batteriandel</a:t>
-            </a:r>
-          </a:p>
-          <a:p>
-            <a:pPr marL="457200" lvl="1" indent="0">
-              <a:buNone/>
-            </a:pPr>
-            <a:endParaRPr lang="da-DK" dirty="0" smtClean="0"/>
-          </a:p>
-          <a:p>
-            <a:r>
-              <a:rPr lang="da-DK" dirty="0" smtClean="0"/>
-              <a:t>Spændingsstabilitet</a:t>
-            </a:r>
-          </a:p>
-          <a:p>
-            <a:pPr lvl="1"/>
-            <a:r>
-              <a:rPr lang="da-DK" dirty="0" smtClean="0"/>
-              <a:t>Overspænding</a:t>
-            </a:r>
-          </a:p>
-          <a:p>
-            <a:pPr lvl="1"/>
-            <a:r>
-              <a:rPr lang="da-DK" dirty="0" smtClean="0"/>
+              <a:rPr lang="da-DK" dirty="0"/>
               <a:t>Underspænding</a:t>
             </a:r>
           </a:p>
@@ -4729,10 +4860,9 @@
           <a:lstStyle/>
           <a:p>
             <a:r>
-              <a:rPr lang="da-DK" dirty="0" smtClean="0"/>
-              <a:t>Model og Simulering</a:t>
-            </a:r>
-            <a:endParaRPr lang="da-DK" dirty="0"/>
+              <a:rPr lang="da-DK" dirty="0"/>
+              <a:t>Model og simulering</a:t>
+            </a:r>
           </a:p>
         </p:txBody>
       </p:sp>
@@ -4759,28 +4889,28 @@
           <a:lstStyle/>
           <a:p>
             <a:r>
-              <a:rPr lang="da-DK" dirty="0" smtClean="0"/>
+              <a:rPr lang="da-DK" dirty="0"/>
               <a:t>Grundlag for modelen</a:t>
             </a:r>
           </a:p>
           <a:p>
             <a:pPr lvl="1"/>
             <a:r>
-              <a:rPr lang="da-DK" dirty="0" smtClean="0"/>
+              <a:rPr lang="da-DK" dirty="0"/>
               <a:t>Produktions og belastningsdata</a:t>
             </a:r>
           </a:p>
           <a:p>
             <a:pPr lvl="1"/>
             <a:r>
-              <a:rPr lang="da-DK" dirty="0" smtClean="0"/>
+              <a:rPr lang="da-DK" dirty="0"/>
               <a:t>Typiske hustandsbatterier</a:t>
             </a:r>
           </a:p>
           <a:p>
             <a:pPr lvl="1"/>
             <a:r>
-              <a:rPr lang="da-DK" dirty="0" smtClean="0"/>
+              <a:rPr lang="da-DK" dirty="0"/>
               <a:t>Modelopbygning</a:t>
             </a:r>
           </a:p>
@@ -4790,7 +4920,7 @@
           </a:p>
           <a:p>
             <a:r>
-              <a:rPr lang="da-DK" dirty="0" smtClean="0"/>
+              <a:rPr lang="da-DK" dirty="0"/>
               <a:t>Simulering</a:t>
             </a:r>
           </a:p>
@@ -4801,15 +4931,15 @@
               </a:lnSpc>
             </a:pPr>
             <a:r>
-              <a:rPr lang="da-DK" dirty="0" smtClean="0"/>
+              <a:rPr lang="da-DK" dirty="0"/>
               <a:t>Husstandsbatteriers evne til at stabilisere </a:t>
             </a:r>
             <a:r>
-              <a:rPr lang="da-DK" dirty="0" err="1" smtClean="0"/>
+              <a:rPr lang="da-DK" dirty="0" err="1"/>
               <a:t>elnettet</a:t>
             </a:r>
             <a:r>
-              <a:rPr lang="da-DK" dirty="0" smtClean="0"/>
+              <a:rPr lang="da-DK" dirty="0"/>
               <a:t> ved fejl på nettet.</a:t>
             </a:r>
           </a:p>
@@ -4820,7 +4950,7 @@
               </a:lnSpc>
             </a:pPr>
             <a:r>
-              <a:rPr lang="da-DK" dirty="0" smtClean="0"/>
+              <a:rPr lang="da-DK" dirty="0"/>
               <a:t>Husstandsbatteriers evne til at absorbere overproduktion.</a:t>
             </a:r>
           </a:p>
@@ -4831,7 +4961,7 @@
               </a:lnSpc>
             </a:pPr>
             <a:r>
-              <a:rPr lang="da-DK" dirty="0" smtClean="0"/>
+              <a:rPr lang="da-DK" dirty="0"/>
               <a:t>Husstandsbatteriers evne til at kompensere for tab af produktion.</a:t>
             </a:r>
           </a:p>
@@ -4842,15 +4972,15 @@
               </a:lnSpc>
             </a:pPr>
             <a:r>
-              <a:rPr lang="da-DK" dirty="0" smtClean="0"/>
+              <a:rPr lang="da-DK" dirty="0"/>
               <a:t>Husstandsbatteriers stabiliserende effekt af </a:t>
             </a:r>
             <a:r>
-              <a:rPr lang="da-DK" dirty="0" err="1" smtClean="0"/>
+              <a:rPr lang="da-DK" dirty="0" err="1"/>
               <a:t>elnettet</a:t>
             </a:r>
             <a:r>
-              <a:rPr lang="da-DK" dirty="0" smtClean="0"/>
+              <a:rPr lang="da-DK" dirty="0"/>
               <a:t> kontra en central batteripark.</a:t>
             </a:r>
           </a:p>
@@ -4906,68 +5036,67 @@
           <a:lstStyle/>
           <a:p>
             <a:r>
-              <a:rPr lang="da-DK" dirty="0" smtClean="0"/>
+              <a:rPr lang="da-DK" dirty="0"/>
               <a:t>Konklusion</a:t>
             </a:r>
+          </a:p>
+        </p:txBody>
+      </p:sp>
+      <p:sp>
+        <p:nvSpPr>
+          <p:cNvPr id="3" name="Pladsholder til indhold 2"/>
+          <p:cNvSpPr>
+            <a:spLocks noGrp="1"/>
+          </p:cNvSpPr>
+          <p:nvPr>
+            <p:ph idx="1"/>
+          </p:nvPr>
+        </p:nvSpPr>
+        <p:spPr/>
+        <p:txBody>
+          <a:bodyPr/>
+          <a:lstStyle/>
+          <a:p>
+            <a:r>
+              <a:rPr lang="da-DK" dirty="0"/>
+              <a:t>Frekvensstabilitet</a:t>
+            </a:r>
+          </a:p>
+          <a:p>
+            <a:pPr lvl="1"/>
+            <a:r>
+              <a:rPr lang="da-DK" dirty="0"/>
+              <a:t>Belastningsbalancering</a:t>
+            </a:r>
+          </a:p>
+          <a:p>
+            <a:pPr lvl="1"/>
+            <a:r>
+              <a:rPr lang="da-DK" dirty="0"/>
+              <a:t>Overkompensering</a:t>
+            </a:r>
+          </a:p>
+          <a:p>
+            <a:pPr lvl="1"/>
             <a:endParaRPr lang="da-DK" dirty="0"/>
           </a:p>
-        </p:txBody>
-      </p:sp>
-      <p:sp>
-        <p:nvSpPr>
-          <p:cNvPr id="3" name="Pladsholder til indhold 2"/>
-          <p:cNvSpPr>
-            <a:spLocks noGrp="1"/>
-          </p:cNvSpPr>
-          <p:nvPr>
-            <p:ph idx="1"/>
-          </p:nvPr>
-        </p:nvSpPr>
-        <p:spPr/>
-        <p:txBody>
-          <a:bodyPr/>
-          <a:lstStyle/>
-          <a:p>
-            <a:r>
-              <a:rPr lang="da-DK" dirty="0" smtClean="0"/>
-              <a:t>Frekvensstabilitet</a:t>
+          <a:p>
+            <a:r>
+              <a:rPr lang="da-DK" dirty="0"/>
+              <a:t>Spændingsstabilitet</a:t>
             </a:r>
           </a:p>
           <a:p>
             <a:pPr lvl="1"/>
             <a:r>
-              <a:rPr lang="da-DK" dirty="0" smtClean="0"/>
-              <a:t>Belastnings udglatning</a:t>
+              <a:rPr lang="da-DK" dirty="0"/>
+              <a:t>Overspænding</a:t>
             </a:r>
           </a:p>
           <a:p>
             <a:pPr lvl="1"/>
             <a:r>
-              <a:rPr lang="da-DK" dirty="0" smtClean="0"/>
-              <a:t>Mangel på inerti</a:t>
-            </a:r>
-          </a:p>
-          <a:p>
-            <a:pPr lvl="1"/>
-            <a:endParaRPr lang="da-DK" dirty="0" smtClean="0"/>
-          </a:p>
-          <a:p>
-            <a:r>
-              <a:rPr lang="da-DK" dirty="0" smtClean="0"/>
-              <a:t>Spændingsstabilitet</a:t>
-            </a:r>
-          </a:p>
-          <a:p>
-            <a:pPr lvl="1"/>
-            <a:r>
-              <a:rPr lang="da-DK" dirty="0" smtClean="0"/>
-              <a:t>Overspænding</a:t>
-            </a:r>
-          </a:p>
-          <a:p>
-            <a:pPr lvl="1"/>
-            <a:r>
-              <a:rPr lang="da-DK" dirty="0" smtClean="0"/>
+              <a:rPr lang="da-DK" dirty="0"/>
               <a:t>Underspænding</a:t>
             </a:r>
           </a:p>
@@ -4976,10 +5105,9 @@
           </a:p>
           <a:p>
             <a:r>
-              <a:rPr lang="da-DK" dirty="0" smtClean="0"/>
+              <a:rPr lang="da-DK" dirty="0"/>
               <a:t>Centralbatteripark</a:t>
             </a:r>
-            <a:endParaRPr lang="da-DK" dirty="0"/>
           </a:p>
         </p:txBody>
       </p:sp>
@@ -5029,10 +5157,9 @@
           <a:lstStyle/>
           <a:p>
             <a:r>
-              <a:rPr lang="da-DK" dirty="0" smtClean="0"/>
+              <a:rPr lang="da-DK" dirty="0"/>
               <a:t>Problemer og forbedringer</a:t>
             </a:r>
-            <a:endParaRPr lang="da-DK" dirty="0"/>
           </a:p>
         </p:txBody>
       </p:sp>
@@ -5057,7 +5184,7 @@
               </a:lnSpc>
             </a:pPr>
             <a:r>
-              <a:rPr lang="da-DK" dirty="0" smtClean="0"/>
+              <a:rPr lang="da-DK" dirty="0"/>
               <a:t>Reaktiv energi</a:t>
             </a:r>
           </a:p>
@@ -5068,8 +5195,8 @@
               </a:lnSpc>
             </a:pPr>
             <a:r>
-              <a:rPr lang="da-DK" dirty="0" smtClean="0"/>
-              <a:t>Frekvens simuleringer</a:t>
+              <a:rPr lang="da-DK" dirty="0"/>
+              <a:t>Frekvenssimuleringer</a:t>
             </a:r>
           </a:p>
           <a:p>
@@ -5079,7 +5206,7 @@
               </a:lnSpc>
             </a:pPr>
             <a:r>
-              <a:rPr lang="da-DK" dirty="0" smtClean="0"/>
+              <a:rPr lang="da-DK" dirty="0"/>
               <a:t>Regulering i modellen</a:t>
             </a:r>
           </a:p>
@@ -5090,12 +5217,12 @@
               </a:lnSpc>
             </a:pPr>
             <a:r>
-              <a:rPr lang="da-DK" dirty="0" smtClean="0"/>
+              <a:rPr lang="da-DK" dirty="0"/>
               <a:t>Simplificeret model</a:t>
             </a:r>
           </a:p>
           <a:p>
-            <a:endParaRPr lang="da-DK" dirty="0" smtClean="0"/>
+            <a:endParaRPr lang="da-DK" dirty="0"/>
           </a:p>
           <a:p>
             <a:endParaRPr lang="da-DK" dirty="0"/>

</xml_diff>